<commit_message>
Changes to password protection
</commit_message>
<xml_diff>
--- a/Day 3/slides/Shiny_Day_3.pptx
+++ b/Day 3/slides/Shiny_Day_3.pptx
@@ -138,10 +138,7 @@
 <file path=ppt/revisionInfo.xml><?xml version="1.0" encoding="utf-8"?>
 <p1510:revInfo xmlns:a="http://schemas.openxmlformats.org/drawingml/2006/main" xmlns:r="http://schemas.openxmlformats.org/officeDocument/2006/relationships" xmlns:p1510="http://schemas.microsoft.com/office/powerpoint/2015/10/main">
   <p1510:revLst>
-    <p1510:client id="{174647C9-DFF9-432A-88E1-27DFFB0A1FE4}" v="886" dt="2023-10-10T08:59:44.036"/>
-    <p1510:client id="{7269427F-0C4B-4B66-B4A4-B12294A90AD9}" v="6" dt="2023-10-10T10:26:30.506"/>
-    <p1510:client id="{8941584A-5300-4F8C-86C8-EF1AC76F05A0}" v="1415" vWet="1417" dt="2023-10-10T08:59:30.750"/>
-    <p1510:client id="{CFF82A62-DE84-4AD7-974B-66D09755D71D}" v="2" dt="2023-10-10T06:35:02.553"/>
+    <p1510:client id="{8941584A-5300-4F8C-86C8-EF1AC76F05A0}" v="1419" dt="2023-10-23T09:17:19.375"/>
   </p1510:revLst>
 </p1510:revInfo>
 </file>
@@ -662,6 +659,30 @@
     </pc:docChg>
   </pc:docChgLst>
   <pc:docChgLst>
+    <pc:chgData name="Julia Moeller" userId="S::julia.moeller@phs.scot::0bcb1583-c1a4-48b5-87e6-2cc074d2d571" providerId="AD" clId="Web-{7269427F-0C4B-4B66-B4A4-B12294A90AD9}"/>
+    <pc:docChg chg="modSld">
+      <pc:chgData name="Julia Moeller" userId="S::julia.moeller@phs.scot::0bcb1583-c1a4-48b5-87e6-2cc074d2d571" providerId="AD" clId="Web-{7269427F-0C4B-4B66-B4A4-B12294A90AD9}" dt="2023-10-10T10:26:30.506" v="5" actId="20577"/>
+      <pc:docMkLst>
+        <pc:docMk/>
+      </pc:docMkLst>
+      <pc:sldChg chg="modSp">
+        <pc:chgData name="Julia Moeller" userId="S::julia.moeller@phs.scot::0bcb1583-c1a4-48b5-87e6-2cc074d2d571" providerId="AD" clId="Web-{7269427F-0C4B-4B66-B4A4-B12294A90AD9}" dt="2023-10-10T10:26:30.506" v="5" actId="20577"/>
+        <pc:sldMkLst>
+          <pc:docMk/>
+          <pc:sldMk cId="1534964209" sldId="270"/>
+        </pc:sldMkLst>
+        <pc:spChg chg="mod">
+          <ac:chgData name="Julia Moeller" userId="S::julia.moeller@phs.scot::0bcb1583-c1a4-48b5-87e6-2cc074d2d571" providerId="AD" clId="Web-{7269427F-0C4B-4B66-B4A4-B12294A90AD9}" dt="2023-10-10T10:26:30.506" v="5" actId="20577"/>
+          <ac:spMkLst>
+            <pc:docMk/>
+            <pc:sldMk cId="1534964209" sldId="270"/>
+            <ac:spMk id="3" creationId="{FA54B944-A237-BAEC-4AFB-D20F3FDF297E}"/>
+          </ac:spMkLst>
+        </pc:spChg>
+      </pc:sldChg>
+    </pc:docChg>
+  </pc:docChgLst>
+  <pc:docChgLst>
     <pc:chgData name="Matthew Forbes" userId="S::matthew.forbes2@phs.scot::89e49754-86d5-48d1-b7fe-89645bb93558" providerId="AD" clId="Web-{CFF82A62-DE84-4AD7-974B-66D09755D71D}"/>
     <pc:docChg chg="modSld">
       <pc:chgData name="Matthew Forbes" userId="S::matthew.forbes2@phs.scot::89e49754-86d5-48d1-b7fe-89645bb93558" providerId="AD" clId="Web-{CFF82A62-DE84-4AD7-974B-66D09755D71D}" dt="2023-10-10T06:35:02.553" v="0" actId="20577"/>
@@ -686,33 +707,9 @@
     </pc:docChg>
   </pc:docChgLst>
   <pc:docChgLst>
-    <pc:chgData name="Julia Moeller" userId="S::julia.moeller@phs.scot::0bcb1583-c1a4-48b5-87e6-2cc074d2d571" providerId="AD" clId="Web-{7269427F-0C4B-4B66-B4A4-B12294A90AD9}"/>
-    <pc:docChg chg="modSld">
-      <pc:chgData name="Julia Moeller" userId="S::julia.moeller@phs.scot::0bcb1583-c1a4-48b5-87e6-2cc074d2d571" providerId="AD" clId="Web-{7269427F-0C4B-4B66-B4A4-B12294A90AD9}" dt="2023-10-10T10:26:30.506" v="5" actId="20577"/>
-      <pc:docMkLst>
-        <pc:docMk/>
-      </pc:docMkLst>
-      <pc:sldChg chg="modSp">
-        <pc:chgData name="Julia Moeller" userId="S::julia.moeller@phs.scot::0bcb1583-c1a4-48b5-87e6-2cc074d2d571" providerId="AD" clId="Web-{7269427F-0C4B-4B66-B4A4-B12294A90AD9}" dt="2023-10-10T10:26:30.506" v="5" actId="20577"/>
-        <pc:sldMkLst>
-          <pc:docMk/>
-          <pc:sldMk cId="1534964209" sldId="270"/>
-        </pc:sldMkLst>
-        <pc:spChg chg="mod">
-          <ac:chgData name="Julia Moeller" userId="S::julia.moeller@phs.scot::0bcb1583-c1a4-48b5-87e6-2cc074d2d571" providerId="AD" clId="Web-{7269427F-0C4B-4B66-B4A4-B12294A90AD9}" dt="2023-10-10T10:26:30.506" v="5" actId="20577"/>
-          <ac:spMkLst>
-            <pc:docMk/>
-            <pc:sldMk cId="1534964209" sldId="270"/>
-            <ac:spMk id="3" creationId="{FA54B944-A237-BAEC-4AFB-D20F3FDF297E}"/>
-          </ac:spMkLst>
-        </pc:spChg>
-      </pc:sldChg>
-    </pc:docChg>
-  </pc:docChgLst>
-  <pc:docChgLst>
     <pc:chgData name="Matthew Forbes" userId="89e49754-86d5-48d1-b7fe-89645bb93558" providerId="ADAL" clId="{8941584A-5300-4F8C-86C8-EF1AC76F05A0}"/>
     <pc:docChg chg="undo redo custSel addSld delSld modSld">
-      <pc:chgData name="Matthew Forbes" userId="89e49754-86d5-48d1-b7fe-89645bb93558" providerId="ADAL" clId="{8941584A-5300-4F8C-86C8-EF1AC76F05A0}" dt="2023-10-10T08:59:20.411" v="2526" actId="20577"/>
+      <pc:chgData name="Matthew Forbes" userId="89e49754-86d5-48d1-b7fe-89645bb93558" providerId="ADAL" clId="{8941584A-5300-4F8C-86C8-EF1AC76F05A0}" dt="2023-10-25T07:45:16.461" v="2603" actId="20577"/>
       <pc:docMkLst>
         <pc:docMk/>
       </pc:docMkLst>
@@ -843,8 +840,8 @@
           </ac:cxnSpMkLst>
         </pc:cxnChg>
       </pc:sldChg>
-      <pc:sldChg chg="modSp new mod">
-        <pc:chgData name="Matthew Forbes" userId="89e49754-86d5-48d1-b7fe-89645bb93558" providerId="ADAL" clId="{8941584A-5300-4F8C-86C8-EF1AC76F05A0}" dt="2023-10-05T14:49:49.796" v="1127" actId="113"/>
+      <pc:sldChg chg="addSp modSp new mod">
+        <pc:chgData name="Matthew Forbes" userId="89e49754-86d5-48d1-b7fe-89645bb93558" providerId="ADAL" clId="{8941584A-5300-4F8C-86C8-EF1AC76F05A0}" dt="2023-10-23T09:17:41.697" v="2601" actId="1076"/>
         <pc:sldMkLst>
           <pc:docMk/>
           <pc:sldMk cId="559860756" sldId="261"/>
@@ -858,16 +855,32 @@
           </ac:spMkLst>
         </pc:spChg>
         <pc:spChg chg="mod">
-          <ac:chgData name="Matthew Forbes" userId="89e49754-86d5-48d1-b7fe-89645bb93558" providerId="ADAL" clId="{8941584A-5300-4F8C-86C8-EF1AC76F05A0}" dt="2023-10-05T14:49:49.796" v="1127" actId="113"/>
+          <ac:chgData name="Matthew Forbes" userId="89e49754-86d5-48d1-b7fe-89645bb93558" providerId="ADAL" clId="{8941584A-5300-4F8C-86C8-EF1AC76F05A0}" dt="2023-10-23T09:17:35.888" v="2599" actId="1076"/>
           <ac:spMkLst>
             <pc:docMk/>
             <pc:sldMk cId="559860756" sldId="261"/>
             <ac:spMk id="3" creationId="{2EEE0E7C-34ED-3F21-0170-E5886A7A12CE}"/>
           </ac:spMkLst>
         </pc:spChg>
+        <pc:picChg chg="add mod">
+          <ac:chgData name="Matthew Forbes" userId="89e49754-86d5-48d1-b7fe-89645bb93558" providerId="ADAL" clId="{8941584A-5300-4F8C-86C8-EF1AC76F05A0}" dt="2023-10-23T09:17:38.545" v="2600" actId="1076"/>
+          <ac:picMkLst>
+            <pc:docMk/>
+            <pc:sldMk cId="559860756" sldId="261"/>
+            <ac:picMk id="4" creationId="{85C20496-31DD-EAC3-80F9-D31025603B17}"/>
+          </ac:picMkLst>
+        </pc:picChg>
+        <pc:picChg chg="add mod">
+          <ac:chgData name="Matthew Forbes" userId="89e49754-86d5-48d1-b7fe-89645bb93558" providerId="ADAL" clId="{8941584A-5300-4F8C-86C8-EF1AC76F05A0}" dt="2023-10-23T09:17:41.697" v="2601" actId="1076"/>
+          <ac:picMkLst>
+            <pc:docMk/>
+            <pc:sldMk cId="559860756" sldId="261"/>
+            <ac:picMk id="5" creationId="{4741CF1B-2E9C-AE91-485E-3FE0A53B1D9D}"/>
+          </ac:picMkLst>
+        </pc:picChg>
       </pc:sldChg>
-      <pc:sldChg chg="addSp modSp new mod">
-        <pc:chgData name="Matthew Forbes" userId="89e49754-86d5-48d1-b7fe-89645bb93558" providerId="ADAL" clId="{8941584A-5300-4F8C-86C8-EF1AC76F05A0}" dt="2023-10-09T14:19:43.168" v="1199" actId="27636"/>
+      <pc:sldChg chg="addSp delSp modSp new mod">
+        <pc:chgData name="Matthew Forbes" userId="89e49754-86d5-48d1-b7fe-89645bb93558" providerId="ADAL" clId="{8941584A-5300-4F8C-86C8-EF1AC76F05A0}" dt="2023-10-20T08:17:46.462" v="2590" actId="14100"/>
         <pc:sldMkLst>
           <pc:docMk/>
           <pc:sldMk cId="1707367984" sldId="262"/>
@@ -889,7 +902,7 @@
           </ac:spMkLst>
         </pc:spChg>
         <pc:spChg chg="add mod">
-          <ac:chgData name="Matthew Forbes" userId="89e49754-86d5-48d1-b7fe-89645bb93558" providerId="ADAL" clId="{8941584A-5300-4F8C-86C8-EF1AC76F05A0}" dt="2023-10-05T14:22:50.171" v="773" actId="20577"/>
+          <ac:chgData name="Matthew Forbes" userId="89e49754-86d5-48d1-b7fe-89645bb93558" providerId="ADAL" clId="{8941584A-5300-4F8C-86C8-EF1AC76F05A0}" dt="2023-10-20T08:12:30.780" v="2585" actId="1076"/>
           <ac:spMkLst>
             <pc:docMk/>
             <pc:sldMk cId="1707367984" sldId="262"/>
@@ -897,31 +910,47 @@
           </ac:spMkLst>
         </pc:spChg>
         <pc:spChg chg="add mod">
-          <ac:chgData name="Matthew Forbes" userId="89e49754-86d5-48d1-b7fe-89645bb93558" providerId="ADAL" clId="{8941584A-5300-4F8C-86C8-EF1AC76F05A0}" dt="2023-10-05T14:25:35.779" v="842" actId="1076"/>
+          <ac:chgData name="Matthew Forbes" userId="89e49754-86d5-48d1-b7fe-89645bb93558" providerId="ADAL" clId="{8941584A-5300-4F8C-86C8-EF1AC76F05A0}" dt="2023-10-20T08:17:46.462" v="2590" actId="14100"/>
           <ac:spMkLst>
             <pc:docMk/>
             <pc:sldMk cId="1707367984" sldId="262"/>
             <ac:spMk id="14" creationId="{D5603D09-627B-97C6-484F-9240D22FC891}"/>
           </ac:spMkLst>
         </pc:spChg>
-        <pc:picChg chg="add mod">
-          <ac:chgData name="Matthew Forbes" userId="89e49754-86d5-48d1-b7fe-89645bb93558" providerId="ADAL" clId="{8941584A-5300-4F8C-86C8-EF1AC76F05A0}" dt="2023-10-05T14:03:40.860" v="727" actId="1076"/>
+        <pc:picChg chg="add del mod">
+          <ac:chgData name="Matthew Forbes" userId="89e49754-86d5-48d1-b7fe-89645bb93558" providerId="ADAL" clId="{8941584A-5300-4F8C-86C8-EF1AC76F05A0}" dt="2023-10-20T08:11:15.237" v="2527" actId="478"/>
           <ac:picMkLst>
             <pc:docMk/>
             <pc:sldMk cId="1707367984" sldId="262"/>
             <ac:picMk id="5" creationId="{86811C95-D161-7E65-83A9-157A1BC6E082}"/>
           </ac:picMkLst>
         </pc:picChg>
-        <pc:cxnChg chg="add mod">
-          <ac:chgData name="Matthew Forbes" userId="89e49754-86d5-48d1-b7fe-89645bb93558" providerId="ADAL" clId="{8941584A-5300-4F8C-86C8-EF1AC76F05A0}" dt="2023-10-05T14:05:37.620" v="734" actId="14100"/>
+        <pc:picChg chg="add mod">
+          <ac:chgData name="Matthew Forbes" userId="89e49754-86d5-48d1-b7fe-89645bb93558" providerId="ADAL" clId="{8941584A-5300-4F8C-86C8-EF1AC76F05A0}" dt="2023-10-20T08:11:20.918" v="2529" actId="1076"/>
+          <ac:picMkLst>
+            <pc:docMk/>
+            <pc:sldMk cId="1707367984" sldId="262"/>
+            <ac:picMk id="6" creationId="{AA404F43-FF4D-A88E-5B2F-94BF9F0EC6F5}"/>
+          </ac:picMkLst>
+        </pc:picChg>
+        <pc:picChg chg="add mod">
+          <ac:chgData name="Matthew Forbes" userId="89e49754-86d5-48d1-b7fe-89645bb93558" providerId="ADAL" clId="{8941584A-5300-4F8C-86C8-EF1AC76F05A0}" dt="2023-10-20T08:17:31.607" v="2587" actId="1076"/>
+          <ac:picMkLst>
+            <pc:docMk/>
+            <pc:sldMk cId="1707367984" sldId="262"/>
+            <ac:picMk id="9" creationId="{F6AB70B2-5C4C-8E66-A343-49CCEBA5B29E}"/>
+          </ac:picMkLst>
+        </pc:picChg>
+        <pc:cxnChg chg="add mod ord">
+          <ac:chgData name="Matthew Forbes" userId="89e49754-86d5-48d1-b7fe-89645bb93558" providerId="ADAL" clId="{8941584A-5300-4F8C-86C8-EF1AC76F05A0}" dt="2023-10-20T08:11:46.550" v="2535" actId="1076"/>
           <ac:cxnSpMkLst>
             <pc:docMk/>
             <pc:sldMk cId="1707367984" sldId="262"/>
             <ac:cxnSpMk id="7" creationId="{A8DB2B83-AACD-D793-2A3F-3414C12E06C5}"/>
           </ac:cxnSpMkLst>
         </pc:cxnChg>
-        <pc:cxnChg chg="add mod">
-          <ac:chgData name="Matthew Forbes" userId="89e49754-86d5-48d1-b7fe-89645bb93558" providerId="ADAL" clId="{8941584A-5300-4F8C-86C8-EF1AC76F05A0}" dt="2023-10-05T14:08:45.629" v="738" actId="1582"/>
+        <pc:cxnChg chg="add mod ord">
+          <ac:chgData name="Matthew Forbes" userId="89e49754-86d5-48d1-b7fe-89645bb93558" providerId="ADAL" clId="{8941584A-5300-4F8C-86C8-EF1AC76F05A0}" dt="2023-10-20T08:17:42.134" v="2589" actId="1076"/>
           <ac:cxnSpMkLst>
             <pc:docMk/>
             <pc:sldMk cId="1707367984" sldId="262"/>
@@ -965,7 +994,7 @@
         </pc:extLst>
       </pc:sldChg>
       <pc:sldChg chg="addSp delSp modSp new mod">
-        <pc:chgData name="Matthew Forbes" userId="89e49754-86d5-48d1-b7fe-89645bb93558" providerId="ADAL" clId="{8941584A-5300-4F8C-86C8-EF1AC76F05A0}" dt="2023-10-10T08:23:27.584" v="2280" actId="20577"/>
+        <pc:chgData name="Matthew Forbes" userId="89e49754-86d5-48d1-b7fe-89645bb93558" providerId="ADAL" clId="{8941584A-5300-4F8C-86C8-EF1AC76F05A0}" dt="2023-10-25T07:45:16.461" v="2603" actId="20577"/>
         <pc:sldMkLst>
           <pc:docMk/>
           <pc:sldMk cId="942721713" sldId="269"/>
@@ -1003,7 +1032,7 @@
           </ac:spMkLst>
         </pc:spChg>
         <pc:spChg chg="add mod">
-          <ac:chgData name="Matthew Forbes" userId="89e49754-86d5-48d1-b7fe-89645bb93558" providerId="ADAL" clId="{8941584A-5300-4F8C-86C8-EF1AC76F05A0}" dt="2023-10-10T08:23:27.584" v="2280" actId="20577"/>
+          <ac:chgData name="Matthew Forbes" userId="89e49754-86d5-48d1-b7fe-89645bb93558" providerId="ADAL" clId="{8941584A-5300-4F8C-86C8-EF1AC76F05A0}" dt="2023-10-25T07:45:16.461" v="2603" actId="20577"/>
           <ac:spMkLst>
             <pc:docMk/>
             <pc:sldMk cId="942721713" sldId="269"/>
@@ -2780,12 +2809,113 @@
           </a:p>
         </p:txBody>
       </p:sp>
+      <p:sp>
+        <p:nvSpPr>
+          <p:cNvPr id="13" name="TextBox 12">
+            <a:extLst>
+              <a:ext uri="{FF2B5EF4-FFF2-40B4-BE49-F238E27FC236}">
+                <a16:creationId xmlns:a16="http://schemas.microsoft.com/office/drawing/2014/main" id="{580D7FAA-A2A8-DFF0-3B97-26A358BA5753}"/>
+              </a:ext>
+            </a:extLst>
+          </p:cNvPr>
+          <p:cNvSpPr txBox="1"/>
+          <p:nvPr/>
+        </p:nvSpPr>
+        <p:spPr>
+          <a:xfrm>
+            <a:off x="8469086" y="3012081"/>
+            <a:ext cx="2884714" cy="1200329"/>
+          </a:xfrm>
+          <a:prstGeom prst="rect">
+            <a:avLst/>
+          </a:prstGeom>
+          <a:noFill/>
+        </p:spPr>
+        <p:txBody>
+          <a:bodyPr wrap="square" rtlCol="0">
+            <a:spAutoFit/>
+          </a:bodyPr>
+          <a:lstStyle/>
+          <a:p>
+            <a:r>
+              <a:rPr lang="en-GB" dirty="0">
+                <a:latin typeface="Arial" panose="020B0604020202020204" pitchFamily="34" charset="0"/>
+                <a:cs typeface="Arial" panose="020B0604020202020204" pitchFamily="34" charset="0"/>
+              </a:rPr>
+              <a:t>Reads in our </a:t>
+            </a:r>
+            <a:r>
+              <a:rPr lang="en-GB" dirty="0" err="1">
+                <a:latin typeface="Arial" panose="020B0604020202020204" pitchFamily="34" charset="0"/>
+                <a:cs typeface="Arial" panose="020B0604020202020204" pitchFamily="34" charset="0"/>
+              </a:rPr>
+              <a:t>credentials.rds</a:t>
+            </a:r>
+            <a:r>
+              <a:rPr lang="en-GB" dirty="0">
+                <a:latin typeface="Arial" panose="020B0604020202020204" pitchFamily="34" charset="0"/>
+                <a:cs typeface="Arial" panose="020B0604020202020204" pitchFamily="34" charset="0"/>
+              </a:rPr>
+              <a:t> file at start of script and wrap UI in </a:t>
+            </a:r>
+            <a:r>
+              <a:rPr lang="en-GB" dirty="0" err="1">
+                <a:latin typeface="Arial" panose="020B0604020202020204" pitchFamily="34" charset="0"/>
+                <a:cs typeface="Arial" panose="020B0604020202020204" pitchFamily="34" charset="0"/>
+              </a:rPr>
+              <a:t>secure_app</a:t>
+            </a:r>
+            <a:endParaRPr lang="en-GB" dirty="0">
+              <a:latin typeface="Arial" panose="020B0604020202020204" pitchFamily="34" charset="0"/>
+              <a:cs typeface="Arial" panose="020B0604020202020204" pitchFamily="34" charset="0"/>
+            </a:endParaRPr>
+          </a:p>
+        </p:txBody>
+      </p:sp>
+      <p:sp>
+        <p:nvSpPr>
+          <p:cNvPr id="14" name="TextBox 13">
+            <a:extLst>
+              <a:ext uri="{FF2B5EF4-FFF2-40B4-BE49-F238E27FC236}">
+                <a16:creationId xmlns:a16="http://schemas.microsoft.com/office/drawing/2014/main" id="{D5603D09-627B-97C6-484F-9240D22FC891}"/>
+              </a:ext>
+            </a:extLst>
+          </p:cNvPr>
+          <p:cNvSpPr txBox="1"/>
+          <p:nvPr/>
+        </p:nvSpPr>
+        <p:spPr>
+          <a:xfrm>
+            <a:off x="7663543" y="4476751"/>
+            <a:ext cx="2046514" cy="1477328"/>
+          </a:xfrm>
+          <a:prstGeom prst="rect">
+            <a:avLst/>
+          </a:prstGeom>
+          <a:noFill/>
+        </p:spPr>
+        <p:txBody>
+          <a:bodyPr wrap="square" rtlCol="0">
+            <a:spAutoFit/>
+          </a:bodyPr>
+          <a:lstStyle/>
+          <a:p>
+            <a:r>
+              <a:rPr lang="en-GB" dirty="0">
+                <a:latin typeface="Arial" panose="020B0604020202020204" pitchFamily="34" charset="0"/>
+                <a:cs typeface="Arial" panose="020B0604020202020204" pitchFamily="34" charset="0"/>
+              </a:rPr>
+              <a:t>Checks what the user enters against the credentials we have set.</a:t>
+            </a:r>
+          </a:p>
+        </p:txBody>
+      </p:sp>
       <p:pic>
         <p:nvPicPr>
-          <p:cNvPr id="5" name="Picture 4">
+          <p:cNvPr id="6" name="Picture 5">
             <a:extLst>
               <a:ext uri="{FF2B5EF4-FFF2-40B4-BE49-F238E27FC236}">
-                <a16:creationId xmlns:a16="http://schemas.microsoft.com/office/drawing/2014/main" id="{86811C95-D161-7E65-83A9-157A1BC6E082}"/>
+                <a16:creationId xmlns:a16="http://schemas.microsoft.com/office/drawing/2014/main" id="{AA404F43-FF4D-A88E-5B2F-94BF9F0EC6F5}"/>
               </a:ext>
             </a:extLst>
           </p:cNvPr>
@@ -2802,8 +2932,8 @@
         </p:blipFill>
         <p:spPr>
           <a:xfrm>
-            <a:off x="838200" y="3151188"/>
-            <a:ext cx="6369081" cy="2656014"/>
+            <a:off x="838200" y="3183599"/>
+            <a:ext cx="5753396" cy="857294"/>
           </a:xfrm>
           <a:prstGeom prst="rect">
             <a:avLst/>
@@ -2826,7 +2956,7 @@
         </p:nvCxnSpPr>
         <p:spPr>
           <a:xfrm flipH="1">
-            <a:off x="4648200" y="3352800"/>
+            <a:off x="5372395" y="3621321"/>
             <a:ext cx="2884714" cy="0"/>
           </a:xfrm>
           <a:prstGeom prst="straightConnector1">
@@ -2851,6 +2981,36 @@
           </a:fontRef>
         </p:style>
       </p:cxnSp>
+      <p:pic>
+        <p:nvPicPr>
+          <p:cNvPr id="9" name="Picture 8">
+            <a:extLst>
+              <a:ext uri="{FF2B5EF4-FFF2-40B4-BE49-F238E27FC236}">
+                <a16:creationId xmlns:a16="http://schemas.microsoft.com/office/drawing/2014/main" id="{F6AB70B2-5C4C-8E66-A343-49CCEBA5B29E}"/>
+              </a:ext>
+            </a:extLst>
+          </p:cNvPr>
+          <p:cNvPicPr>
+            <a:picLocks noChangeAspect="1"/>
+          </p:cNvPicPr>
+          <p:nvPr/>
+        </p:nvPicPr>
+        <p:blipFill>
+          <a:blip r:embed="rId3"/>
+          <a:stretch>
+            <a:fillRect/>
+          </a:stretch>
+        </p:blipFill>
+        <p:spPr>
+          <a:xfrm>
+            <a:off x="850963" y="4073304"/>
+            <a:ext cx="4521432" cy="2324219"/>
+          </a:xfrm>
+          <a:prstGeom prst="rect">
+            <a:avLst/>
+          </a:prstGeom>
+        </p:spPr>
+      </p:pic>
       <p:cxnSp>
         <p:nvCxnSpPr>
           <p:cNvPr id="11" name="Straight Arrow Connector 10">
@@ -2867,7 +3027,7 @@
         </p:nvCxnSpPr>
         <p:spPr>
           <a:xfrm flipH="1">
-            <a:off x="4974771" y="5072743"/>
+            <a:off x="4887686" y="5443624"/>
             <a:ext cx="2688772" cy="0"/>
           </a:xfrm>
           <a:prstGeom prst="straightConnector1">
@@ -2892,96 +3052,6 @@
           </a:fontRef>
         </p:style>
       </p:cxnSp>
-      <p:sp>
-        <p:nvSpPr>
-          <p:cNvPr id="13" name="TextBox 12">
-            <a:extLst>
-              <a:ext uri="{FF2B5EF4-FFF2-40B4-BE49-F238E27FC236}">
-                <a16:creationId xmlns:a16="http://schemas.microsoft.com/office/drawing/2014/main" id="{580D7FAA-A2A8-DFF0-3B97-26A358BA5753}"/>
-              </a:ext>
-            </a:extLst>
-          </p:cNvPr>
-          <p:cNvSpPr txBox="1"/>
-          <p:nvPr/>
-        </p:nvSpPr>
-        <p:spPr>
-          <a:xfrm>
-            <a:off x="7663543" y="3151188"/>
-            <a:ext cx="2884714" cy="646331"/>
-          </a:xfrm>
-          <a:prstGeom prst="rect">
-            <a:avLst/>
-          </a:prstGeom>
-          <a:noFill/>
-        </p:spPr>
-        <p:txBody>
-          <a:bodyPr wrap="square" rtlCol="0">
-            <a:spAutoFit/>
-          </a:bodyPr>
-          <a:lstStyle/>
-          <a:p>
-            <a:r>
-              <a:rPr lang="en-GB">
-                <a:latin typeface="Arial" panose="020B0604020202020204" pitchFamily="34" charset="0"/>
-                <a:cs typeface="Arial" panose="020B0604020202020204" pitchFamily="34" charset="0"/>
-              </a:rPr>
-              <a:t>Reads in our </a:t>
-            </a:r>
-            <a:r>
-              <a:rPr lang="en-GB" err="1">
-                <a:latin typeface="Arial" panose="020B0604020202020204" pitchFamily="34" charset="0"/>
-                <a:cs typeface="Arial" panose="020B0604020202020204" pitchFamily="34" charset="0"/>
-              </a:rPr>
-              <a:t>credentials.rds</a:t>
-            </a:r>
-            <a:r>
-              <a:rPr lang="en-GB">
-                <a:latin typeface="Arial" panose="020B0604020202020204" pitchFamily="34" charset="0"/>
-                <a:cs typeface="Arial" panose="020B0604020202020204" pitchFamily="34" charset="0"/>
-              </a:rPr>
-              <a:t> file</a:t>
-            </a:r>
-          </a:p>
-        </p:txBody>
-      </p:sp>
-      <p:sp>
-        <p:nvSpPr>
-          <p:cNvPr id="14" name="TextBox 13">
-            <a:extLst>
-              <a:ext uri="{FF2B5EF4-FFF2-40B4-BE49-F238E27FC236}">
-                <a16:creationId xmlns:a16="http://schemas.microsoft.com/office/drawing/2014/main" id="{D5603D09-627B-97C6-484F-9240D22FC891}"/>
-              </a:ext>
-            </a:extLst>
-          </p:cNvPr>
-          <p:cNvSpPr txBox="1"/>
-          <p:nvPr/>
-        </p:nvSpPr>
-        <p:spPr>
-          <a:xfrm>
-            <a:off x="7663543" y="4476751"/>
-            <a:ext cx="3069772" cy="923330"/>
-          </a:xfrm>
-          <a:prstGeom prst="rect">
-            <a:avLst/>
-          </a:prstGeom>
-          <a:noFill/>
-        </p:spPr>
-        <p:txBody>
-          <a:bodyPr wrap="square" rtlCol="0">
-            <a:spAutoFit/>
-          </a:bodyPr>
-          <a:lstStyle/>
-          <a:p>
-            <a:r>
-              <a:rPr lang="en-GB">
-                <a:latin typeface="Arial" panose="020B0604020202020204" pitchFamily="34" charset="0"/>
-                <a:cs typeface="Arial" panose="020B0604020202020204" pitchFamily="34" charset="0"/>
-              </a:rPr>
-              <a:t>Checks what the user enters against the credentials we have set.</a:t>
-            </a:r>
-          </a:p>
-        </p:txBody>
-      </p:sp>
     </p:spTree>
     <p:extLst>
       <p:ext uri="{BB962C8B-B14F-4D97-AF65-F5344CB8AC3E}">
@@ -3058,23 +3128,28 @@
             <p:ph idx="1"/>
           </p:nvPr>
         </p:nvSpPr>
-        <p:spPr/>
+        <p:spPr>
+          <a:xfrm>
+            <a:off x="838200" y="1509939"/>
+            <a:ext cx="10515600" cy="4351338"/>
+          </a:xfrm>
+        </p:spPr>
         <p:txBody>
           <a:bodyPr/>
           <a:lstStyle/>
           <a:p>
             <a:r>
-              <a:rPr lang="en-GB"/>
+              <a:rPr lang="en-GB" dirty="0"/>
               <a:t>Create a username and password for your Shiny app.</a:t>
             </a:r>
           </a:p>
           <a:p>
             <a:r>
-              <a:rPr lang="en-GB"/>
+              <a:rPr lang="en-GB" dirty="0"/>
               <a:t>Wrap the UI within the </a:t>
             </a:r>
             <a:r>
-              <a:rPr lang="en-GB" b="1" err="1">
+              <a:rPr lang="en-GB" b="1" dirty="0" err="1">
                 <a:solidFill>
                   <a:srgbClr val="7030A0"/>
                 </a:solidFill>
@@ -3082,7 +3157,7 @@
               <a:t>secure_app</a:t>
             </a:r>
             <a:r>
-              <a:rPr lang="en-GB" b="1">
+              <a:rPr lang="en-GB" b="1" dirty="0">
                 <a:solidFill>
                   <a:srgbClr val="7030A0"/>
                 </a:solidFill>
@@ -3090,30 +3165,90 @@
               <a:t> </a:t>
             </a:r>
             <a:r>
-              <a:rPr lang="en-GB"/>
+              <a:rPr lang="en-GB" dirty="0"/>
               <a:t>function.</a:t>
             </a:r>
           </a:p>
           <a:p>
             <a:r>
-              <a:rPr lang="en-GB"/>
+              <a:rPr lang="en-GB" dirty="0"/>
               <a:t>Read in your credentials script.</a:t>
             </a:r>
           </a:p>
           <a:p>
             <a:r>
-              <a:rPr lang="en-GB"/>
+              <a:rPr lang="en-GB" dirty="0"/>
               <a:t>Add the required lines of code to your server.</a:t>
             </a:r>
           </a:p>
           <a:p>
             <a:r>
-              <a:rPr lang="en-GB"/>
+              <a:rPr lang="en-GB" dirty="0"/>
               <a:t>Run your app – Does your username and password work?</a:t>
             </a:r>
           </a:p>
         </p:txBody>
       </p:sp>
+      <p:pic>
+        <p:nvPicPr>
+          <p:cNvPr id="4" name="Picture 3">
+            <a:extLst>
+              <a:ext uri="{FF2B5EF4-FFF2-40B4-BE49-F238E27FC236}">
+                <a16:creationId xmlns:a16="http://schemas.microsoft.com/office/drawing/2014/main" id="{85C20496-31DD-EAC3-80F9-D31025603B17}"/>
+              </a:ext>
+            </a:extLst>
+          </p:cNvPr>
+          <p:cNvPicPr>
+            <a:picLocks noChangeAspect="1"/>
+          </p:cNvPicPr>
+          <p:nvPr/>
+        </p:nvPicPr>
+        <p:blipFill>
+          <a:blip r:embed="rId2"/>
+          <a:stretch>
+            <a:fillRect/>
+          </a:stretch>
+        </p:blipFill>
+        <p:spPr>
+          <a:xfrm>
+            <a:off x="838200" y="3802993"/>
+            <a:ext cx="4353217" cy="2239770"/>
+          </a:xfrm>
+          <a:prstGeom prst="rect">
+            <a:avLst/>
+          </a:prstGeom>
+        </p:spPr>
+      </p:pic>
+      <p:pic>
+        <p:nvPicPr>
+          <p:cNvPr id="5" name="Picture 4">
+            <a:extLst>
+              <a:ext uri="{FF2B5EF4-FFF2-40B4-BE49-F238E27FC236}">
+                <a16:creationId xmlns:a16="http://schemas.microsoft.com/office/drawing/2014/main" id="{4741CF1B-2E9C-AE91-485E-3FE0A53B1D9D}"/>
+              </a:ext>
+            </a:extLst>
+          </p:cNvPr>
+          <p:cNvPicPr>
+            <a:picLocks noChangeAspect="1"/>
+          </p:cNvPicPr>
+          <p:nvPr/>
+        </p:nvPicPr>
+        <p:blipFill>
+          <a:blip r:embed="rId3"/>
+          <a:stretch>
+            <a:fillRect/>
+          </a:stretch>
+        </p:blipFill>
+        <p:spPr>
+          <a:xfrm>
+            <a:off x="5328579" y="3802993"/>
+            <a:ext cx="4353217" cy="2238293"/>
+          </a:xfrm>
+          <a:prstGeom prst="rect">
+            <a:avLst/>
+          </a:prstGeom>
+        </p:spPr>
+      </p:pic>
     </p:spTree>
     <p:extLst>
       <p:ext uri="{BB962C8B-B14F-4D97-AF65-F5344CB8AC3E}">
@@ -3166,7 +3301,7 @@
           <a:lstStyle/>
           <a:p>
             <a:r>
-              <a:rPr lang="en-GB">
+              <a:rPr lang="en-GB" dirty="0">
                 <a:latin typeface="Arial Black" panose="020B0A04020102020204" pitchFamily="34" charset="0"/>
               </a:rPr>
               <a:t>Publishing a Shiny App</a:t>
@@ -3201,101 +3336,101 @@
           <a:lstStyle/>
           <a:p>
             <a:r>
-              <a:rPr lang="en-GB"/>
+              <a:rPr lang="en-GB" dirty="0"/>
               <a:t>For published apps, we use the </a:t>
             </a:r>
             <a:r>
-              <a:rPr lang="en-GB" b="1"/>
+              <a:rPr lang="en-GB" b="1" dirty="0"/>
               <a:t>scotland.shinyapps.io </a:t>
             </a:r>
             <a:r>
-              <a:rPr lang="en-GB"/>
+              <a:rPr lang="en-GB" dirty="0"/>
               <a:t>server.</a:t>
             </a:r>
-            <a:endParaRPr lang="en-GB" b="1"/>
+            <a:endParaRPr lang="en-GB" b="1" dirty="0"/>
           </a:p>
           <a:p>
             <a:pPr lvl="1"/>
             <a:r>
-              <a:rPr lang="en-GB"/>
+              <a:rPr lang="en-GB" dirty="0"/>
               <a:t>This is shared with the Scottish Government</a:t>
             </a:r>
           </a:p>
           <a:p>
             <a:r>
-              <a:rPr lang="en-GB"/>
+              <a:rPr lang="en-GB" dirty="0"/>
               <a:t>To deploy an app on this server we need both a </a:t>
             </a:r>
             <a:r>
-              <a:rPr lang="en-GB" b="1"/>
+              <a:rPr lang="en-GB" b="1" dirty="0"/>
               <a:t>Token </a:t>
             </a:r>
             <a:r>
-              <a:rPr lang="en-GB"/>
+              <a:rPr lang="en-GB" dirty="0"/>
               <a:t>and a </a:t>
             </a:r>
             <a:r>
-              <a:rPr lang="en-GB" b="1"/>
+              <a:rPr lang="en-GB" b="1" dirty="0"/>
               <a:t>Secret.</a:t>
             </a:r>
           </a:p>
           <a:p>
             <a:pPr lvl="1"/>
             <a:r>
-              <a:rPr lang="en-GB"/>
+              <a:rPr lang="en-GB" dirty="0"/>
               <a:t>These can be obtained from the R Shiny user group by asking who the current administrators are.</a:t>
             </a:r>
           </a:p>
           <a:p>
             <a:pPr lvl="1"/>
             <a:r>
-              <a:rPr lang="en-GB"/>
+              <a:rPr lang="en-GB" dirty="0"/>
               <a:t>Important that you don’t share these codes with others.</a:t>
             </a:r>
           </a:p>
           <a:p>
             <a:r>
-              <a:rPr lang="en-GB"/>
+              <a:rPr lang="en-GB" dirty="0"/>
               <a:t>The app name should ideally be </a:t>
             </a:r>
             <a:r>
-              <a:rPr lang="en-GB" b="1"/>
+              <a:rPr lang="en-GB" b="1" dirty="0"/>
               <a:t>phs-&lt;</a:t>
             </a:r>
             <a:r>
-              <a:rPr lang="en-GB" b="1" err="1"/>
+              <a:rPr lang="en-GB" b="1" dirty="0" err="1"/>
               <a:t>nameofapp</a:t>
             </a:r>
             <a:r>
-              <a:rPr lang="en-GB" b="1"/>
+              <a:rPr lang="en-GB" b="1" dirty="0"/>
               <a:t>&gt;-app </a:t>
             </a:r>
             <a:r>
-              <a:rPr lang="en-GB"/>
+              <a:rPr lang="en-GB" dirty="0"/>
               <a:t>so that PHS dashboards can be easily identified.</a:t>
             </a:r>
           </a:p>
           <a:p>
             <a:r>
-              <a:rPr lang="en-GB" b="1"/>
+              <a:rPr lang="en-GB" b="1" dirty="0"/>
               <a:t>Note: </a:t>
             </a:r>
             <a:r>
-              <a:rPr lang="en-GB"/>
+              <a:rPr lang="en-GB" dirty="0"/>
               <a:t>All file paths within the shiny dashboard should be relative and not absolute. I.e. Paths should not be /</a:t>
             </a:r>
             <a:r>
-              <a:rPr lang="en-GB" err="1"/>
+              <a:rPr lang="en-GB" dirty="0" err="1"/>
               <a:t>PHI_conf</a:t>
             </a:r>
             <a:r>
-              <a:rPr lang="en-GB"/>
+              <a:rPr lang="en-GB" dirty="0"/>
               <a:t>/… but should be pathways related to the working directory that the Shiny app is in</a:t>
             </a:r>
-            <a:endParaRPr lang="en-GB" b="1"/>
-          </a:p>
-          <a:p>
-            <a:endParaRPr lang="en-GB"/>
+            <a:endParaRPr lang="en-GB" b="1" dirty="0"/>
+          </a:p>
+          <a:p>
+            <a:endParaRPr lang="en-GB" dirty="0"/>
           </a:p>
         </p:txBody>
       </p:sp>
@@ -3427,7 +3562,7 @@
               <a:buChar char="•"/>
             </a:pPr>
             <a:r>
-              <a:rPr lang="en-GB" sz="2100">
+              <a:rPr lang="en-GB" sz="2100" dirty="0">
                 <a:latin typeface="Arial" panose="020B0604020202020204" pitchFamily="34" charset="0"/>
                 <a:cs typeface="Arial" panose="020B0604020202020204" pitchFamily="34" charset="0"/>
               </a:rPr>
@@ -3440,28 +3575,28 @@
               <a:buChar char="•"/>
             </a:pPr>
             <a:r>
-              <a:rPr lang="en-GB" sz="2100">
+              <a:rPr lang="en-GB" sz="2100" dirty="0">
                 <a:latin typeface="Arial" panose="020B0604020202020204" pitchFamily="34" charset="0"/>
                 <a:cs typeface="Arial" panose="020B0604020202020204" pitchFamily="34" charset="0"/>
               </a:rPr>
               <a:t>This requires the </a:t>
             </a:r>
             <a:r>
-              <a:rPr lang="en-GB" sz="2100" b="1" err="1">
+              <a:rPr lang="en-GB" sz="2100" b="1" dirty="0" err="1">
                 <a:latin typeface="Arial" panose="020B0604020202020204" pitchFamily="34" charset="0"/>
                 <a:cs typeface="Arial" panose="020B0604020202020204" pitchFamily="34" charset="0"/>
               </a:rPr>
               <a:t>rsconnect</a:t>
             </a:r>
             <a:r>
-              <a:rPr lang="en-GB" sz="2100" b="1">
+              <a:rPr lang="en-GB" sz="2100" b="1" dirty="0">
                 <a:latin typeface="Arial" panose="020B0604020202020204" pitchFamily="34" charset="0"/>
                 <a:cs typeface="Arial" panose="020B0604020202020204" pitchFamily="34" charset="0"/>
               </a:rPr>
               <a:t> package </a:t>
             </a:r>
             <a:r>
-              <a:rPr lang="en-GB" sz="2100">
+              <a:rPr lang="en-GB" sz="2100" dirty="0">
                 <a:latin typeface="Arial" panose="020B0604020202020204" pitchFamily="34" charset="0"/>
                 <a:cs typeface="Arial" panose="020B0604020202020204" pitchFamily="34" charset="0"/>
               </a:rPr>
@@ -3474,18 +3609,18 @@
               <a:buChar char="•"/>
             </a:pPr>
             <a:r>
-              <a:rPr lang="en-GB" sz="2100">
+              <a:rPr lang="en-GB" sz="2100" dirty="0">
                 <a:latin typeface="Arial" panose="020B0604020202020204" pitchFamily="34" charset="0"/>
                 <a:cs typeface="Arial" panose="020B0604020202020204" pitchFamily="34" charset="0"/>
               </a:rPr>
               <a:t>This will publish our app to the web address </a:t>
             </a:r>
             <a:r>
-              <a:rPr lang="en-GB" sz="2100" b="1">
+              <a:rPr lang="en-GB" sz="2100" b="1" dirty="0">
                 <a:latin typeface="Arial" panose="020B0604020202020204" pitchFamily="34" charset="0"/>
                 <a:cs typeface="Arial" panose="020B0604020202020204" pitchFamily="34" charset="0"/>
               </a:rPr>
-              <a:t>https://scotland.shinyapps.io/&lt;appname&gt;</a:t>
+              <a:t>https://scotland.shinyapps.io/&lt;appName&gt;</a:t>
             </a:r>
           </a:p>
         </p:txBody>
@@ -4542,56 +4677,56 @@
           <a:lstStyle/>
           <a:p>
             <a:r>
-              <a:rPr lang="en-GB"/>
+              <a:rPr lang="en-GB" dirty="0"/>
               <a:t>There are several ready made Shiny themes that you can use in your dashboard, see </a:t>
             </a:r>
             <a:r>
-              <a:rPr lang="en-GB">
+              <a:rPr lang="en-GB" dirty="0">
                 <a:hlinkClick r:id="rId2"/>
               </a:rPr>
               <a:t>https://shiny.rstudio.com/gallery/shiny-theme-selector.html</a:t>
             </a:r>
             <a:r>
-              <a:rPr lang="en-GB"/>
+              <a:rPr lang="en-GB" dirty="0"/>
               <a:t> for full list.</a:t>
             </a:r>
             <a:br>
-              <a:rPr lang="en-GB"/>
+              <a:rPr lang="en-GB" dirty="0"/>
             </a:br>
-            <a:endParaRPr lang="en-GB"/>
-          </a:p>
-          <a:p>
-            <a:r>
-              <a:rPr lang="en-GB"/>
+            <a:endParaRPr lang="en-GB" dirty="0"/>
+          </a:p>
+          <a:p>
+            <a:r>
+              <a:rPr lang="en-GB" dirty="0"/>
               <a:t>You can use tags, e.g. </a:t>
             </a:r>
             <a:r>
-              <a:rPr lang="en-GB" b="1"/>
+              <a:rPr lang="en-GB" b="1" dirty="0"/>
               <a:t>h1 </a:t>
             </a:r>
             <a:r>
-              <a:rPr lang="en-GB"/>
+              <a:rPr lang="en-GB" dirty="0"/>
               <a:t>and </a:t>
             </a:r>
             <a:r>
-              <a:rPr lang="en-GB" b="1" err="1"/>
+              <a:rPr lang="en-GB" b="1" dirty="0" err="1"/>
               <a:t>tags$i</a:t>
             </a:r>
             <a:r>
-              <a:rPr lang="en-GB"/>
+              <a:rPr lang="en-GB" dirty="0"/>
               <a:t>, to change your titles and text</a:t>
             </a:r>
           </a:p>
           <a:p>
-            <a:endParaRPr lang="en-GB"/>
-          </a:p>
-          <a:p>
-            <a:r>
-              <a:rPr lang="en-GB"/>
+            <a:endParaRPr lang="en-GB" dirty="0"/>
+          </a:p>
+          <a:p>
+            <a:r>
+              <a:rPr lang="en-GB" dirty="0"/>
               <a:t>You can use </a:t>
             </a:r>
             <a:r>
-              <a:rPr lang="en-GB" b="1">
+              <a:rPr lang="en-GB" b="1" dirty="0">
                 <a:solidFill>
                   <a:srgbClr val="7030A0"/>
                 </a:solidFill>
@@ -4599,33 +4734,33 @@
               <a:t>icon()</a:t>
             </a:r>
             <a:r>
-              <a:rPr lang="en-GB"/>
+              <a:rPr lang="en-GB" dirty="0"/>
               <a:t> to add any of the icons found on Font Awesome and </a:t>
             </a:r>
             <a:r>
-              <a:rPr lang="en-GB" err="1"/>
+              <a:rPr lang="en-GB" dirty="0" err="1"/>
               <a:t>Glyphicon</a:t>
             </a:r>
             <a:r>
-              <a:rPr lang="en-GB"/>
+              <a:rPr lang="en-GB" dirty="0"/>
               <a:t>: </a:t>
             </a:r>
             <a:r>
-              <a:rPr lang="en-GB">
+              <a:rPr lang="en-GB" dirty="0">
                 <a:hlinkClick r:id="rId3"/>
               </a:rPr>
               <a:t>https://fontawesome.com/v5.15/icons?d=gallery&amp;p=2</a:t>
             </a:r>
             <a:br>
-              <a:rPr lang="en-GB"/>
+              <a:rPr lang="en-GB" dirty="0"/>
             </a:br>
             <a:r>
-              <a:rPr lang="en-GB">
+              <a:rPr lang="en-GB" dirty="0">
                 <a:hlinkClick r:id="rId4"/>
               </a:rPr>
               <a:t>https://getbootstrap.com/docs/3.3/components/#glyphicons</a:t>
             </a:r>
-            <a:endParaRPr lang="en-GB"/>
+            <a:endParaRPr lang="en-GB" dirty="0"/>
           </a:p>
         </p:txBody>
       </p:sp>
@@ -5773,13 +5908,13 @@
           <a:lstStyle/>
           <a:p>
             <a:r>
-              <a:rPr lang="en-GB"/>
+              <a:rPr lang="en-GB" dirty="0"/>
               <a:t>Required when publishing an app for PRA.</a:t>
             </a:r>
           </a:p>
           <a:p>
             <a:r>
-              <a:rPr lang="en-GB"/>
+              <a:rPr lang="en-GB" dirty="0"/>
               <a:t>We need to create a Create Credentials Script.</a:t>
             </a:r>
           </a:p>
@@ -5787,7 +5922,7 @@
             <a:pPr marL="0" indent="0">
               <a:buNone/>
             </a:pPr>
-            <a:endParaRPr lang="en-GB"/>
+            <a:endParaRPr lang="en-GB" dirty="0"/>
           </a:p>
         </p:txBody>
       </p:sp>
@@ -6357,15 +6492,6 @@
 </file>
 
 <file path=customXml/item1.xml><?xml version="1.0" encoding="utf-8"?>
-<?mso-contentType ?>
-<FormTemplates xmlns="http://schemas.microsoft.com/sharepoint/v3/contenttype/forms">
-  <Display>DocumentLibraryForm</Display>
-  <Edit>DocumentLibraryForm</Edit>
-  <New>DocumentLibraryForm</New>
-</FormTemplates>
-</file>
-
-<file path=customXml/item2.xml><?xml version="1.0" encoding="utf-8"?>
 <ct:contentTypeSchema xmlns:ct="http://schemas.microsoft.com/office/2006/metadata/contentType" xmlns:ma="http://schemas.microsoft.com/office/2006/metadata/properties/metaAttributes" ct:_="" ma:_="" ma:contentTypeName="Document" ma:contentTypeID="0x010100F9163B9352FB5A4788BB54FA79E45A9B" ma:contentTypeVersion="10" ma:contentTypeDescription="Create a new document." ma:contentTypeScope="" ma:versionID="d7db80f1aefda32c0e8557789dcfc61a">
   <xsd:schema xmlns:xsd="http://www.w3.org/2001/XMLSchema" xmlns:xs="http://www.w3.org/2001/XMLSchema" xmlns:p="http://schemas.microsoft.com/office/2006/metadata/properties" xmlns:ns2="e155261d-e7be-4e14-8f3f-074943e30468" xmlns:ns3="9777d510-7a84-4d86-adcc-ed6491094c98" targetNamespace="http://schemas.microsoft.com/office/2006/metadata/properties" ma:root="true" ma:fieldsID="ca472082848a01cf90554cbe48082752" ns2:_="" ns3:_="">
     <xsd:import namespace="e155261d-e7be-4e14-8f3f-074943e30468"/>
@@ -6564,6 +6690,15 @@
 </ct:contentTypeSchema>
 </file>
 
+<file path=customXml/item2.xml><?xml version="1.0" encoding="utf-8"?>
+<?mso-contentType ?>
+<FormTemplates xmlns="http://schemas.microsoft.com/sharepoint/v3/contenttype/forms">
+  <Display>DocumentLibraryForm</Display>
+  <Edit>DocumentLibraryForm</Edit>
+  <New>DocumentLibraryForm</New>
+</FormTemplates>
+</file>
+
 <file path=customXml/item3.xml><?xml version="1.0" encoding="utf-8"?>
 <p:properties xmlns:p="http://schemas.microsoft.com/office/2006/metadata/properties" xmlns:xsi="http://www.w3.org/2001/XMLSchema-instance" xmlns:pc="http://schemas.microsoft.com/office/infopath/2007/PartnerControls">
   <documentManagement>
@@ -6575,14 +6710,6 @@
 </file>
 
 <file path=customXml/itemProps1.xml><?xml version="1.0" encoding="utf-8"?>
-<ds:datastoreItem xmlns:ds="http://schemas.openxmlformats.org/officeDocument/2006/customXml" ds:itemID="{AD6B120D-A0FB-4DD8-992E-3D48283A8AF5}">
-  <ds:schemaRefs>
-    <ds:schemaRef ds:uri="http://schemas.microsoft.com/sharepoint/v3/contenttype/forms"/>
-  </ds:schemaRefs>
-</ds:datastoreItem>
-</file>
-
-<file path=customXml/itemProps2.xml><?xml version="1.0" encoding="utf-8"?>
 <ds:datastoreItem xmlns:ds="http://schemas.openxmlformats.org/officeDocument/2006/customXml" ds:itemID="{8C0DF580-322E-4D01-B764-119052B09323}">
   <ds:schemaRefs>
     <ds:schemaRef ds:uri="9777d510-7a84-4d86-adcc-ed6491094c98"/>
@@ -6601,19 +6728,27 @@
 </ds:datastoreItem>
 </file>
 
+<file path=customXml/itemProps2.xml><?xml version="1.0" encoding="utf-8"?>
+<ds:datastoreItem xmlns:ds="http://schemas.openxmlformats.org/officeDocument/2006/customXml" ds:itemID="{AD6B120D-A0FB-4DD8-992E-3D48283A8AF5}">
+  <ds:schemaRefs>
+    <ds:schemaRef ds:uri="http://schemas.microsoft.com/sharepoint/v3/contenttype/forms"/>
+  </ds:schemaRefs>
+</ds:datastoreItem>
+</file>
+
 <file path=customXml/itemProps3.xml><?xml version="1.0" encoding="utf-8"?>
 <ds:datastoreItem xmlns:ds="http://schemas.openxmlformats.org/officeDocument/2006/customXml" ds:itemID="{4C73297F-598B-4DCB-BCE9-E508A25225E1}">
   <ds:schemaRefs>
+    <ds:schemaRef ds:uri="http://schemas.microsoft.com/office/2006/documentManagement/types"/>
+    <ds:schemaRef ds:uri="http://purl.org/dc/terms/"/>
+    <ds:schemaRef ds:uri="http://purl.org/dc/dcmitype/"/>
+    <ds:schemaRef ds:uri="http://schemas.microsoft.com/office/infopath/2007/PartnerControls"/>
+    <ds:schemaRef ds:uri="http://purl.org/dc/elements/1.1/"/>
+    <ds:schemaRef ds:uri="http://schemas.microsoft.com/office/2006/metadata/properties"/>
+    <ds:schemaRef ds:uri="http://www.w3.org/XML/1998/namespace"/>
+    <ds:schemaRef ds:uri="http://schemas.openxmlformats.org/package/2006/metadata/core-properties"/>
     <ds:schemaRef ds:uri="9777d510-7a84-4d86-adcc-ed6491094c98"/>
     <ds:schemaRef ds:uri="e155261d-e7be-4e14-8f3f-074943e30468"/>
-    <ds:schemaRef ds:uri="http://purl.org/dc/dcmitype/"/>
-    <ds:schemaRef ds:uri="http://purl.org/dc/elements/1.1/"/>
-    <ds:schemaRef ds:uri="http://purl.org/dc/terms/"/>
-    <ds:schemaRef ds:uri="http://schemas.microsoft.com/office/2006/documentManagement/types"/>
-    <ds:schemaRef ds:uri="http://schemas.microsoft.com/office/2006/metadata/properties"/>
-    <ds:schemaRef ds:uri="http://schemas.microsoft.com/office/infopath/2007/PartnerControls"/>
-    <ds:schemaRef ds:uri="http://schemas.openxmlformats.org/package/2006/metadata/core-properties"/>
-    <ds:schemaRef ds:uri="http://www.w3.org/XML/1998/namespace"/>
   </ds:schemaRefs>
 </ds:datastoreItem>
 </file>
</xml_diff>